<commit_message>
Changes award printing to print single document
</commit_message>
<xml_diff>
--- a/templates/challengeActivitiesAward_template.pptx
+++ b/templates/challengeActivitiesAward_template.pptx
@@ -53,7 +53,7 @@
       </p:grpSpPr>
       <p:sp>
         <p:nvSpPr>
-          <p:cNvPr id="22" name="PlaceHolder 1"/>
+          <p:cNvPr id="21" name="PlaceHolder 1"/>
           <p:cNvSpPr>
             <a:spLocks noGrp="1"/>
           </p:cNvSpPr>
@@ -63,8 +63,8 @@
         </p:nvSpPr>
         <p:spPr>
           <a:xfrm>
-            <a:off x="311760" y="744480"/>
-            <a:ext cx="8519760" cy="2052000"/>
+            <a:off x="457200" y="205200"/>
+            <a:ext cx="8229240" cy="858600"/>
           </a:xfrm>
           <a:prstGeom prst="rect">
             <a:avLst/>
@@ -84,7 +84,7 @@
       </p:sp>
       <p:sp>
         <p:nvSpPr>
-          <p:cNvPr id="23" name="PlaceHolder 2"/>
+          <p:cNvPr id="22" name="PlaceHolder 2"/>
           <p:cNvSpPr>
             <a:spLocks noGrp="1"/>
           </p:cNvSpPr>
@@ -114,7 +114,7 @@
       </p:sp>
       <p:sp>
         <p:nvSpPr>
-          <p:cNvPr id="24" name="PlaceHolder 3"/>
+          <p:cNvPr id="23" name="PlaceHolder 3"/>
           <p:cNvSpPr>
             <a:spLocks noGrp="1"/>
           </p:cNvSpPr>
@@ -166,7 +166,7 @@
       </p:grpSpPr>
       <p:sp>
         <p:nvSpPr>
-          <p:cNvPr id="25" name="PlaceHolder 1"/>
+          <p:cNvPr id="24" name="PlaceHolder 1"/>
           <p:cNvSpPr>
             <a:spLocks noGrp="1"/>
           </p:cNvSpPr>
@@ -176,8 +176,8 @@
         </p:nvSpPr>
         <p:spPr>
           <a:xfrm>
-            <a:off x="311760" y="744480"/>
-            <a:ext cx="8519760" cy="2052000"/>
+            <a:off x="457200" y="205200"/>
+            <a:ext cx="8229240" cy="858600"/>
           </a:xfrm>
           <a:prstGeom prst="rect">
             <a:avLst/>
@@ -197,7 +197,7 @@
       </p:sp>
       <p:sp>
         <p:nvSpPr>
-          <p:cNvPr id="26" name="PlaceHolder 2"/>
+          <p:cNvPr id="25" name="PlaceHolder 2"/>
           <p:cNvSpPr>
             <a:spLocks noGrp="1"/>
           </p:cNvSpPr>
@@ -227,7 +227,7 @@
       </p:sp>
       <p:sp>
         <p:nvSpPr>
-          <p:cNvPr id="27" name="PlaceHolder 3"/>
+          <p:cNvPr id="26" name="PlaceHolder 3"/>
           <p:cNvSpPr>
             <a:spLocks noGrp="1"/>
           </p:cNvSpPr>
@@ -257,7 +257,7 @@
       </p:sp>
       <p:sp>
         <p:nvSpPr>
-          <p:cNvPr id="28" name="PlaceHolder 4"/>
+          <p:cNvPr id="27" name="PlaceHolder 4"/>
           <p:cNvSpPr>
             <a:spLocks noGrp="1"/>
           </p:cNvSpPr>
@@ -287,7 +287,7 @@
       </p:sp>
       <p:sp>
         <p:nvSpPr>
-          <p:cNvPr id="29" name="PlaceHolder 5"/>
+          <p:cNvPr id="28" name="PlaceHolder 5"/>
           <p:cNvSpPr>
             <a:spLocks noGrp="1"/>
           </p:cNvSpPr>
@@ -339,7 +339,7 @@
       </p:grpSpPr>
       <p:sp>
         <p:nvSpPr>
-          <p:cNvPr id="30" name="PlaceHolder 1"/>
+          <p:cNvPr id="29" name="PlaceHolder 1"/>
           <p:cNvSpPr>
             <a:spLocks noGrp="1"/>
           </p:cNvSpPr>
@@ -349,8 +349,8 @@
         </p:nvSpPr>
         <p:spPr>
           <a:xfrm>
-            <a:off x="311760" y="744480"/>
-            <a:ext cx="8519760" cy="2052000"/>
+            <a:off x="457200" y="205200"/>
+            <a:ext cx="8229240" cy="858600"/>
           </a:xfrm>
           <a:prstGeom prst="rect">
             <a:avLst/>
@@ -370,7 +370,7 @@
       </p:sp>
       <p:sp>
         <p:nvSpPr>
-          <p:cNvPr id="31" name="PlaceHolder 2"/>
+          <p:cNvPr id="30" name="PlaceHolder 2"/>
           <p:cNvSpPr>
             <a:spLocks noGrp="1"/>
           </p:cNvSpPr>
@@ -400,7 +400,7 @@
       </p:sp>
       <p:sp>
         <p:nvSpPr>
-          <p:cNvPr id="32" name="PlaceHolder 3"/>
+          <p:cNvPr id="31" name="PlaceHolder 3"/>
           <p:cNvSpPr>
             <a:spLocks noGrp="1"/>
           </p:cNvSpPr>
@@ -430,7 +430,7 @@
       </p:sp>
       <p:sp>
         <p:nvSpPr>
-          <p:cNvPr id="33" name="PlaceHolder 4"/>
+          <p:cNvPr id="32" name="PlaceHolder 4"/>
           <p:cNvSpPr>
             <a:spLocks noGrp="1"/>
           </p:cNvSpPr>
@@ -460,7 +460,7 @@
       </p:sp>
       <p:sp>
         <p:nvSpPr>
-          <p:cNvPr id="34" name="PlaceHolder 5"/>
+          <p:cNvPr id="33" name="PlaceHolder 5"/>
           <p:cNvSpPr>
             <a:spLocks noGrp="1"/>
           </p:cNvSpPr>
@@ -490,7 +490,7 @@
       </p:sp>
       <p:sp>
         <p:nvSpPr>
-          <p:cNvPr id="35" name="PlaceHolder 6"/>
+          <p:cNvPr id="34" name="PlaceHolder 6"/>
           <p:cNvSpPr>
             <a:spLocks noGrp="1"/>
           </p:cNvSpPr>
@@ -520,7 +520,7 @@
       </p:sp>
       <p:sp>
         <p:nvSpPr>
-          <p:cNvPr id="36" name="PlaceHolder 7"/>
+          <p:cNvPr id="35" name="PlaceHolder 7"/>
           <p:cNvSpPr>
             <a:spLocks noGrp="1"/>
           </p:cNvSpPr>
@@ -572,7 +572,7 @@
       </p:grpSpPr>
       <p:sp>
         <p:nvSpPr>
-          <p:cNvPr id="1" name="PlaceHolder 1"/>
+          <p:cNvPr id="0" name="PlaceHolder 1"/>
           <p:cNvSpPr>
             <a:spLocks noGrp="1"/>
           </p:cNvSpPr>
@@ -582,8 +582,8 @@
         </p:nvSpPr>
         <p:spPr>
           <a:xfrm>
-            <a:off x="311760" y="744480"/>
-            <a:ext cx="8519760" cy="2052000"/>
+            <a:off x="457200" y="205200"/>
+            <a:ext cx="8229240" cy="858600"/>
           </a:xfrm>
           <a:prstGeom prst="rect">
             <a:avLst/>
@@ -603,7 +603,7 @@
       </p:sp>
       <p:sp>
         <p:nvSpPr>
-          <p:cNvPr id="2" name="PlaceHolder 2"/>
+          <p:cNvPr id="1" name="PlaceHolder 2"/>
           <p:cNvSpPr>
             <a:spLocks noGrp="1"/>
           </p:cNvSpPr>
@@ -656,7 +656,7 @@
       </p:grpSpPr>
       <p:sp>
         <p:nvSpPr>
-          <p:cNvPr id="3" name="PlaceHolder 1"/>
+          <p:cNvPr id="2" name="PlaceHolder 1"/>
           <p:cNvSpPr>
             <a:spLocks noGrp="1"/>
           </p:cNvSpPr>
@@ -666,8 +666,8 @@
         </p:nvSpPr>
         <p:spPr>
           <a:xfrm>
-            <a:off x="311760" y="744480"/>
-            <a:ext cx="8519760" cy="2052000"/>
+            <a:off x="457200" y="205200"/>
+            <a:ext cx="8229240" cy="858600"/>
           </a:xfrm>
           <a:prstGeom prst="rect">
             <a:avLst/>
@@ -687,7 +687,7 @@
       </p:sp>
       <p:sp>
         <p:nvSpPr>
-          <p:cNvPr id="4" name="PlaceHolder 2"/>
+          <p:cNvPr id="3" name="PlaceHolder 2"/>
           <p:cNvSpPr>
             <a:spLocks noGrp="1"/>
           </p:cNvSpPr>
@@ -739,7 +739,7 @@
       </p:grpSpPr>
       <p:sp>
         <p:nvSpPr>
-          <p:cNvPr id="5" name="PlaceHolder 1"/>
+          <p:cNvPr id="4" name="PlaceHolder 1"/>
           <p:cNvSpPr>
             <a:spLocks noGrp="1"/>
           </p:cNvSpPr>
@@ -749,8 +749,8 @@
         </p:nvSpPr>
         <p:spPr>
           <a:xfrm>
-            <a:off x="311760" y="744480"/>
-            <a:ext cx="8519760" cy="2052000"/>
+            <a:off x="457200" y="205200"/>
+            <a:ext cx="8229240" cy="858600"/>
           </a:xfrm>
           <a:prstGeom prst="rect">
             <a:avLst/>
@@ -770,7 +770,7 @@
       </p:sp>
       <p:sp>
         <p:nvSpPr>
-          <p:cNvPr id="6" name="PlaceHolder 2"/>
+          <p:cNvPr id="5" name="PlaceHolder 2"/>
           <p:cNvSpPr>
             <a:spLocks noGrp="1"/>
           </p:cNvSpPr>
@@ -800,7 +800,7 @@
       </p:sp>
       <p:sp>
         <p:nvSpPr>
-          <p:cNvPr id="7" name="PlaceHolder 3"/>
+          <p:cNvPr id="6" name="PlaceHolder 3"/>
           <p:cNvSpPr>
             <a:spLocks noGrp="1"/>
           </p:cNvSpPr>
@@ -852,7 +852,7 @@
       </p:grpSpPr>
       <p:sp>
         <p:nvSpPr>
-          <p:cNvPr id="8" name="PlaceHolder 1"/>
+          <p:cNvPr id="7" name="PlaceHolder 1"/>
           <p:cNvSpPr>
             <a:spLocks noGrp="1"/>
           </p:cNvSpPr>
@@ -862,8 +862,8 @@
         </p:nvSpPr>
         <p:spPr>
           <a:xfrm>
-            <a:off x="311760" y="744480"/>
-            <a:ext cx="8519760" cy="2052000"/>
+            <a:off x="457200" y="205200"/>
+            <a:ext cx="8229240" cy="858600"/>
           </a:xfrm>
           <a:prstGeom prst="rect">
             <a:avLst/>
@@ -905,7 +905,7 @@
       </p:grpSpPr>
       <p:sp>
         <p:nvSpPr>
-          <p:cNvPr id="9" name="PlaceHolder 1"/>
+          <p:cNvPr id="8" name="PlaceHolder 1"/>
           <p:cNvSpPr>
             <a:spLocks noGrp="1"/>
           </p:cNvSpPr>
@@ -915,8 +915,8 @@
         </p:nvSpPr>
         <p:spPr>
           <a:xfrm>
-            <a:off x="311760" y="744480"/>
-            <a:ext cx="8519760" cy="9513000"/>
+            <a:off x="457200" y="205200"/>
+            <a:ext cx="8229240" cy="3981240"/>
           </a:xfrm>
           <a:prstGeom prst="rect">
             <a:avLst/>
@@ -958,7 +958,7 @@
       </p:grpSpPr>
       <p:sp>
         <p:nvSpPr>
-          <p:cNvPr id="10" name="PlaceHolder 1"/>
+          <p:cNvPr id="9" name="PlaceHolder 1"/>
           <p:cNvSpPr>
             <a:spLocks noGrp="1"/>
           </p:cNvSpPr>
@@ -968,8 +968,8 @@
         </p:nvSpPr>
         <p:spPr>
           <a:xfrm>
-            <a:off x="311760" y="744480"/>
-            <a:ext cx="8519760" cy="2052000"/>
+            <a:off x="457200" y="205200"/>
+            <a:ext cx="8229240" cy="858600"/>
           </a:xfrm>
           <a:prstGeom prst="rect">
             <a:avLst/>
@@ -989,7 +989,7 @@
       </p:sp>
       <p:sp>
         <p:nvSpPr>
-          <p:cNvPr id="11" name="PlaceHolder 2"/>
+          <p:cNvPr id="10" name="PlaceHolder 2"/>
           <p:cNvSpPr>
             <a:spLocks noGrp="1"/>
           </p:cNvSpPr>
@@ -1019,7 +1019,7 @@
       </p:sp>
       <p:sp>
         <p:nvSpPr>
-          <p:cNvPr id="12" name="PlaceHolder 3"/>
+          <p:cNvPr id="11" name="PlaceHolder 3"/>
           <p:cNvSpPr>
             <a:spLocks noGrp="1"/>
           </p:cNvSpPr>
@@ -1049,7 +1049,7 @@
       </p:sp>
       <p:sp>
         <p:nvSpPr>
-          <p:cNvPr id="13" name="PlaceHolder 4"/>
+          <p:cNvPr id="12" name="PlaceHolder 4"/>
           <p:cNvSpPr>
             <a:spLocks noGrp="1"/>
           </p:cNvSpPr>
@@ -1101,7 +1101,7 @@
       </p:grpSpPr>
       <p:sp>
         <p:nvSpPr>
-          <p:cNvPr id="14" name="PlaceHolder 1"/>
+          <p:cNvPr id="13" name="PlaceHolder 1"/>
           <p:cNvSpPr>
             <a:spLocks noGrp="1"/>
           </p:cNvSpPr>
@@ -1111,8 +1111,8 @@
         </p:nvSpPr>
         <p:spPr>
           <a:xfrm>
-            <a:off x="311760" y="744480"/>
-            <a:ext cx="8519760" cy="2052000"/>
+            <a:off x="457200" y="205200"/>
+            <a:ext cx="8229240" cy="858600"/>
           </a:xfrm>
           <a:prstGeom prst="rect">
             <a:avLst/>
@@ -1132,7 +1132,7 @@
       </p:sp>
       <p:sp>
         <p:nvSpPr>
-          <p:cNvPr id="15" name="PlaceHolder 2"/>
+          <p:cNvPr id="14" name="PlaceHolder 2"/>
           <p:cNvSpPr>
             <a:spLocks noGrp="1"/>
           </p:cNvSpPr>
@@ -1162,7 +1162,7 @@
       </p:sp>
       <p:sp>
         <p:nvSpPr>
-          <p:cNvPr id="16" name="PlaceHolder 3"/>
+          <p:cNvPr id="15" name="PlaceHolder 3"/>
           <p:cNvSpPr>
             <a:spLocks noGrp="1"/>
           </p:cNvSpPr>
@@ -1192,7 +1192,7 @@
       </p:sp>
       <p:sp>
         <p:nvSpPr>
-          <p:cNvPr id="17" name="PlaceHolder 4"/>
+          <p:cNvPr id="16" name="PlaceHolder 4"/>
           <p:cNvSpPr>
             <a:spLocks noGrp="1"/>
           </p:cNvSpPr>
@@ -1244,7 +1244,7 @@
       </p:grpSpPr>
       <p:sp>
         <p:nvSpPr>
-          <p:cNvPr id="18" name="PlaceHolder 1"/>
+          <p:cNvPr id="17" name="PlaceHolder 1"/>
           <p:cNvSpPr>
             <a:spLocks noGrp="1"/>
           </p:cNvSpPr>
@@ -1254,8 +1254,8 @@
         </p:nvSpPr>
         <p:spPr>
           <a:xfrm>
-            <a:off x="311760" y="744480"/>
-            <a:ext cx="8519760" cy="2052000"/>
+            <a:off x="457200" y="205200"/>
+            <a:ext cx="8229240" cy="858600"/>
           </a:xfrm>
           <a:prstGeom prst="rect">
             <a:avLst/>
@@ -1275,7 +1275,7 @@
       </p:sp>
       <p:sp>
         <p:nvSpPr>
-          <p:cNvPr id="19" name="PlaceHolder 2"/>
+          <p:cNvPr id="18" name="PlaceHolder 2"/>
           <p:cNvSpPr>
             <a:spLocks noGrp="1"/>
           </p:cNvSpPr>
@@ -1305,7 +1305,7 @@
       </p:sp>
       <p:sp>
         <p:nvSpPr>
-          <p:cNvPr id="20" name="PlaceHolder 3"/>
+          <p:cNvPr id="19" name="PlaceHolder 3"/>
           <p:cNvSpPr>
             <a:spLocks noGrp="1"/>
           </p:cNvSpPr>
@@ -1335,7 +1335,7 @@
       </p:sp>
       <p:sp>
         <p:nvSpPr>
-          <p:cNvPr id="21" name="PlaceHolder 4"/>
+          <p:cNvPr id="20" name="PlaceHolder 4"/>
           <p:cNvSpPr>
             <a:spLocks noGrp="1"/>
           </p:cNvSpPr>
@@ -1392,42 +1392,6 @@
           <a:chExt cx="0" cy="0"/>
         </a:xfrm>
       </p:grpSpPr>
-      <p:sp>
-        <p:nvSpPr>
-          <p:cNvPr id="0" name="PlaceHolder 1"/>
-          <p:cNvSpPr>
-            <a:spLocks noGrp="1"/>
-          </p:cNvSpPr>
-          <p:nvPr>
-            <p:ph type="title"/>
-          </p:nvPr>
-        </p:nvSpPr>
-        <p:spPr>
-          <a:xfrm>
-            <a:off x="311760" y="744480"/>
-            <a:ext cx="8519760" cy="2052000"/>
-          </a:xfrm>
-          <a:prstGeom prst="rect">
-            <a:avLst/>
-          </a:prstGeom>
-        </p:spPr>
-        <p:txBody>
-          <a:bodyPr lIns="0" rIns="0" tIns="0" bIns="0" anchor="ctr">
-            <a:noAutofit/>
-          </a:bodyPr>
-          <a:p>
-            <a:r>
-              <a:rPr b="0" lang="en-US" sz="1800" spc="-1" strike="noStrike">
-                <a:latin typeface="Arial"/>
-              </a:rPr>
-              <a:t>Click to edit the title text format</a:t>
-            </a:r>
-            <a:endParaRPr b="0" lang="en-US" sz="1800" spc="-1" strike="noStrike">
-              <a:latin typeface="Arial"/>
-            </a:endParaRPr>
-          </a:p>
-        </p:txBody>
-      </p:sp>
     </p:spTree>
   </p:cSld>
   <p:clrMap bg1="lt1" bg2="lt2" tx1="dk1" tx2="dk2" accent1="accent1" accent2="accent2" accent3="accent3" accent4="accent4" accent5="accent5" accent6="accent6" hlink="hlink" folHlink="folHlink"/>
@@ -1467,14 +1431,14 @@
       </p:grpSpPr>
       <p:sp>
         <p:nvSpPr>
-          <p:cNvPr id="37" name="Google Shape;54;p13"/>
+          <p:cNvPr id="36" name="awardData"/>
           <p:cNvSpPr/>
           <p:nvPr/>
         </p:nvSpPr>
         <p:spPr>
           <a:xfrm>
-            <a:off x="311760" y="1427760"/>
-            <a:ext cx="8519760" cy="431640"/>
+            <a:off x="311760" y="1371600"/>
+            <a:ext cx="8518320" cy="430200"/>
           </a:xfrm>
           <a:prstGeom prst="rect">
             <a:avLst/>
@@ -1639,11 +1603,81 @@
               <a:latin typeface="Arial"/>
             </a:endParaRPr>
           </a:p>
+          <a:p>
+            <a:pPr algn="ctr">
+              <a:lnSpc>
+                <a:spcPct val="100000"/>
+              </a:lnSpc>
+              <a:tabLst>
+                <a:tab algn="l" pos="0"/>
+              </a:tabLst>
+            </a:pPr>
+            <a:r>
+              <a:rPr b="0" lang="en" sz="1800" spc="-1" strike="noStrike">
+                <a:solidFill>
+                  <a:srgbClr val="595959"/>
+                </a:solidFill>
+                <a:latin typeface="Georgia"/>
+                <a:ea typeface="Georgia"/>
+              </a:rPr>
+              <a:t>Luke Pastore, Griffin DeGrappo</a:t>
+            </a:r>
+            <a:endParaRPr b="0" lang="en-US" sz="1800" spc="-1" strike="noStrike">
+              <a:latin typeface="Arial"/>
+            </a:endParaRPr>
+          </a:p>
+          <a:p>
+            <a:pPr algn="ctr">
+              <a:lnSpc>
+                <a:spcPct val="100000"/>
+              </a:lnSpc>
+              <a:tabLst>
+                <a:tab algn="l" pos="0"/>
+              </a:tabLst>
+            </a:pPr>
+            <a:br/>
+            <a:r>
+              <a:rPr b="0" lang="en" sz="1800" spc="-1" strike="noStrike">
+                <a:solidFill>
+                  <a:srgbClr val="595959"/>
+                </a:solidFill>
+                <a:latin typeface="Georgia"/>
+                <a:ea typeface="Georgia"/>
+              </a:rPr>
+              <a:t>2023</a:t>
+            </a:r>
+            <a:endParaRPr b="0" lang="en-US" sz="1800" spc="-1" strike="noStrike">
+              <a:latin typeface="Arial"/>
+            </a:endParaRPr>
+          </a:p>
+          <a:p>
+            <a:pPr algn="ctr">
+              <a:lnSpc>
+                <a:spcPct val="100000"/>
+              </a:lnSpc>
+              <a:tabLst>
+                <a:tab algn="l" pos="0"/>
+              </a:tabLst>
+            </a:pPr>
+            <a:r>
+              <a:rPr b="0" lang="en-US" sz="1800" spc="-1" strike="noStrike">
+                <a:solidFill>
+                  <a:srgbClr val="000000"/>
+                </a:solidFill>
+                <a:latin typeface="Arial"/>
+                <a:ea typeface="DejaVu Sans"/>
+              </a:rPr>
+              <a:t>{weekTitle}</a:t>
+            </a:r>
+            <a:endParaRPr b="0" lang="en-US" sz="1800" spc="-1" strike="noStrike">
+              <a:latin typeface="Arial"/>
+            </a:endParaRPr>
+          </a:p>
         </p:txBody>
       </p:sp>
       <p:pic>
         <p:nvPicPr>
-          <p:cNvPr id="38" name="Google Shape;55;p13" descr=""/>
+          <p:cNvPr id="37" name="Google Shape;55;p13" descr=""/>
           <p:cNvPicPr/>
           <p:nvPr/>
         </p:nvPicPr>
@@ -1654,7 +1688,7 @@
         <p:spPr>
           <a:xfrm>
             <a:off x="83160" y="3436920"/>
-            <a:ext cx="2000880" cy="1462680"/>
+            <a:ext cx="1999440" cy="1461240"/>
           </a:xfrm>
           <a:prstGeom prst="rect">
             <a:avLst/>
@@ -1666,14 +1700,14 @@
       </p:pic>
       <p:sp>
         <p:nvSpPr>
-          <p:cNvPr id="39" name="Google Shape;56;p13"/>
+          <p:cNvPr id="38" name="Google Shape;56;p13"/>
           <p:cNvSpPr txBox="1"/>
           <p:nvPr/>
         </p:nvSpPr>
         <p:spPr>
           <a:xfrm>
             <a:off x="704880" y="258480"/>
-            <a:ext cx="7977960" cy="968400"/>
+            <a:ext cx="7976520" cy="966960"/>
           </a:xfrm>
           <a:prstGeom prst="rect">
             <a:avLst/>
@@ -1721,68 +1755,14 @@
       </p:sp>
       <p:sp>
         <p:nvSpPr>
-          <p:cNvPr id="40" name="Google Shape;57;p13"/>
+          <p:cNvPr id="39" name="Google Shape;58;p13"/>
           <p:cNvSpPr/>
           <p:nvPr/>
         </p:nvSpPr>
         <p:spPr>
-          <a:xfrm>
-            <a:off x="2843640" y="3947400"/>
-            <a:ext cx="3456000" cy="396000"/>
-          </a:xfrm>
-          <a:prstGeom prst="rect">
-            <a:avLst/>
-          </a:prstGeom>
-          <a:noFill/>
-          <a:ln w="0">
-            <a:noFill/>
-          </a:ln>
-        </p:spPr>
-        <p:style>
-          <a:lnRef idx="0"/>
-          <a:fillRef idx="0"/>
-          <a:effectRef idx="0"/>
-          <a:fontRef idx="minor"/>
-        </p:style>
-        <p:txBody>
-          <a:bodyPr lIns="90000" rIns="90000" tIns="91440" bIns="91440">
-            <a:spAutoFit/>
-          </a:bodyPr>
-          <a:p>
-            <a:pPr algn="ctr">
-              <a:lnSpc>
-                <a:spcPct val="100000"/>
-              </a:lnSpc>
-              <a:tabLst>
-                <a:tab algn="l" pos="0"/>
-              </a:tabLst>
-            </a:pPr>
-            <a:r>
-              <a:rPr b="0" lang="en" sz="1400" spc="-1" strike="noStrike">
-                <a:solidFill>
-                  <a:srgbClr val="000000"/>
-                </a:solidFill>
-                <a:latin typeface="Georgia"/>
-                <a:ea typeface="Georgia"/>
-              </a:rPr>
-              <a:t>Luke Pastore, Griffin DeGrappo</a:t>
-            </a:r>
-            <a:endParaRPr b="0" lang="en-US" sz="1400" spc="-1" strike="noStrike">
-              <a:latin typeface="Arial"/>
-            </a:endParaRPr>
-          </a:p>
-        </p:txBody>
-      </p:sp>
-      <p:sp>
-        <p:nvSpPr>
-          <p:cNvPr id="41" name="Google Shape;58;p13"/>
-          <p:cNvSpPr/>
-          <p:nvPr/>
-        </p:nvSpPr>
-        <p:spPr>
           <a:xfrm flipH="1" rot="10800000">
-            <a:off x="2263680" y="3871800"/>
-            <a:ext cx="4593960" cy="14400"/>
+            <a:off x="2264760" y="3657960"/>
+            <a:ext cx="4592520" cy="12960"/>
           </a:xfrm>
           <a:custGeom>
             <a:avLst/>
@@ -1817,7 +1797,7 @@
       </p:sp>
       <p:pic>
         <p:nvPicPr>
-          <p:cNvPr id="42" name="Google Shape;59;p13" descr=""/>
+          <p:cNvPr id="40" name="Google Shape;59;p13" descr=""/>
           <p:cNvPicPr/>
           <p:nvPr/>
         </p:nvPicPr>
@@ -1828,7 +1808,7 @@
         <p:spPr>
           <a:xfrm>
             <a:off x="6858000" y="1688760"/>
-            <a:ext cx="1911600" cy="1639080"/>
+            <a:ext cx="1910160" cy="1637640"/>
           </a:xfrm>
           <a:prstGeom prst="rect">
             <a:avLst/>
@@ -1838,83 +1818,6 @@
           </a:ln>
         </p:spPr>
       </p:pic>
-      <p:sp>
-        <p:nvSpPr>
-          <p:cNvPr id="43" name="Google Shape;60;p13"/>
-          <p:cNvSpPr/>
-          <p:nvPr/>
-        </p:nvSpPr>
-        <p:spPr>
-          <a:xfrm>
-            <a:off x="2990520" y="4420440"/>
-            <a:ext cx="3162240" cy="608760"/>
-          </a:xfrm>
-          <a:prstGeom prst="rect">
-            <a:avLst/>
-          </a:prstGeom>
-          <a:noFill/>
-          <a:ln w="0">
-            <a:noFill/>
-          </a:ln>
-        </p:spPr>
-        <p:style>
-          <a:lnRef idx="0"/>
-          <a:fillRef idx="0"/>
-          <a:effectRef idx="0"/>
-          <a:fontRef idx="minor"/>
-        </p:style>
-        <p:txBody>
-          <a:bodyPr lIns="90000" rIns="90000" tIns="91440" bIns="91440">
-            <a:spAutoFit/>
-          </a:bodyPr>
-          <a:p>
-            <a:pPr algn="ctr">
-              <a:lnSpc>
-                <a:spcPct val="100000"/>
-              </a:lnSpc>
-              <a:tabLst>
-                <a:tab algn="l" pos="0"/>
-              </a:tabLst>
-            </a:pPr>
-            <a:r>
-              <a:rPr b="0" lang="en" sz="1400" spc="-1" strike="noStrike">
-                <a:solidFill>
-                  <a:srgbClr val="000000"/>
-                </a:solidFill>
-                <a:latin typeface="Georgia"/>
-                <a:ea typeface="Georgia"/>
-              </a:rPr>
-              <a:t>Week {weekNumber}</a:t>
-            </a:r>
-            <a:endParaRPr b="0" lang="en-US" sz="1400" spc="-1" strike="noStrike">
-              <a:latin typeface="Arial"/>
-            </a:endParaRPr>
-          </a:p>
-          <a:p>
-            <a:pPr algn="ctr">
-              <a:lnSpc>
-                <a:spcPct val="100000"/>
-              </a:lnSpc>
-              <a:tabLst>
-                <a:tab algn="l" pos="0"/>
-              </a:tabLst>
-            </a:pPr>
-            <a:r>
-              <a:rPr b="0" i="1" lang="en" sz="1400" spc="-1" strike="noStrike">
-                <a:solidFill>
-                  <a:srgbClr val="000000"/>
-                </a:solidFill>
-                <a:latin typeface="Georgia"/>
-                <a:ea typeface="Georgia"/>
-              </a:rPr>
-              <a:t>{weekTitle}</a:t>
-            </a:r>
-            <a:endParaRPr b="0" lang="en-US" sz="1400" spc="-1" strike="noStrike">
-              <a:latin typeface="Arial"/>
-            </a:endParaRPr>
-          </a:p>
-        </p:txBody>
-      </p:sp>
     </p:spTree>
   </p:cSld>
   <mc:AlternateContent>

</xml_diff>